<commit_message>
correction CP_build_MSTs, animate gray-edges.pptx
</commit_message>
<xml_diff>
--- a/spring16/slidesS16/gray-edges.pptx
+++ b/spring16/slidesS16/gray-edges.pptx
@@ -3987,7 +3987,7 @@
           <a:graphicData uri="http://schemas.openxmlformats.org/presentationml/2006/ole">
             <mc:AlternateContent xmlns:mc="http://schemas.openxmlformats.org/markup-compatibility/2006">
               <mc:Choice xmlns:v="urn:schemas-microsoft-com:vml" Requires="v">
-                <p:oleObj spid="_x0000_s19469" name="Equation" r:id="rId3" imgW="635000" imgH="228600" progId="Equation.DSMT4">
+                <p:oleObj spid="_x0000_s19471" name="Equation" r:id="rId3" imgW="635000" imgH="228600" progId="Equation.DSMT4">
                   <p:embed/>
                 </p:oleObj>
               </mc:Choice>
@@ -4851,7 +4851,7 @@
           <a:graphicData uri="http://schemas.openxmlformats.org/presentationml/2006/ole">
             <mc:AlternateContent xmlns:mc="http://schemas.openxmlformats.org/markup-compatibility/2006">
               <mc:Choice xmlns:v="urn:schemas-microsoft-com:vml" Requires="v">
-                <p:oleObj spid="_x0000_s2129" name="Equation" r:id="rId3" imgW="1117600" imgH="152400" progId="Equation.DSMT4">
+                <p:oleObj spid="_x0000_s2132" name="Equation" r:id="rId3" imgW="1117600" imgH="152400" progId="Equation.DSMT4">
                   <p:embed/>
                 </p:oleObj>
               </mc:Choice>
@@ -4908,7 +4908,7 @@
           <a:graphicData uri="http://schemas.openxmlformats.org/presentationml/2006/ole">
             <mc:AlternateContent xmlns:mc="http://schemas.openxmlformats.org/markup-compatibility/2006">
               <mc:Choice xmlns:v="urn:schemas-microsoft-com:vml" Requires="v">
-                <p:oleObj spid="_x0000_s2130" name="Equation" r:id="rId5" imgW="889000" imgH="190500" progId="Equation.DSMT4">
+                <p:oleObj spid="_x0000_s2133" name="Equation" r:id="rId5" imgW="889000" imgH="190500" progId="Equation.DSMT4">
                   <p:embed/>
                 </p:oleObj>
               </mc:Choice>
@@ -7420,12 +7420,16 @@
   <p:clrMapOvr>
     <a:masterClrMapping/>
   </p:clrMapOvr>
-  <mc:AlternateContent xmlns:mc="http://schemas.openxmlformats.org/markup-compatibility/2006" xmlns:p14="http://schemas.microsoft.com/office/powerpoint/2010/main">
-    <mc:Choice Requires="p14">
-      <p:transition p14:dur="0" advClick="0"/>
+  <mc:AlternateContent xmlns:mc="http://schemas.openxmlformats.org/markup-compatibility/2006">
+    <mc:Choice xmlns:p14="http://schemas.microsoft.com/office/powerpoint/2010/main" Requires="p14">
+      <p:transition spd="med" p14:dur="700" advClick="0">
+        <p:fade/>
+      </p:transition>
     </mc:Choice>
-    <mc:Fallback xmlns="">
-      <p:transition xmlns:p14="http://schemas.microsoft.com/office/powerpoint/2010/main" advClick="0"/>
+    <mc:Fallback>
+      <p:transition xmlns:p14="http://schemas.microsoft.com/office/powerpoint/2010/main" spd="med" advClick="0">
+        <p:fade/>
+      </p:transition>
     </mc:Fallback>
   </mc:AlternateContent>
   <p:timing>
@@ -14521,7 +14525,7 @@
           <a:graphicData uri="http://schemas.openxmlformats.org/presentationml/2006/ole">
             <mc:AlternateContent xmlns:mc="http://schemas.openxmlformats.org/markup-compatibility/2006">
               <mc:Choice xmlns:v="urn:schemas-microsoft-com:vml" Requires="v">
-                <p:oleObj spid="_x0000_s23569" name="Equation" r:id="rId3" imgW="393700" imgH="228600" progId="Equation.DSMT4">
+                <p:oleObj spid="_x0000_s23571" name="Equation" r:id="rId3" imgW="393700" imgH="228600" progId="Equation.DSMT4">
                   <p:embed/>
                 </p:oleObj>
               </mc:Choice>
@@ -17079,7 +17083,7 @@
           <a:graphicData uri="http://schemas.openxmlformats.org/presentationml/2006/ole">
             <mc:AlternateContent xmlns:mc="http://schemas.openxmlformats.org/markup-compatibility/2006">
               <mc:Choice xmlns:v="urn:schemas-microsoft-com:vml" Requires="v">
-                <p:oleObj spid="_x0000_s9260" name="Equation" r:id="rId3" imgW="635000" imgH="228600" progId="Equation.DSMT4">
+                <p:oleObj spid="_x0000_s9262" name="Equation" r:id="rId3" imgW="635000" imgH="228600" progId="Equation.DSMT4">
                   <p:embed/>
                 </p:oleObj>
               </mc:Choice>
@@ -17497,7 +17501,7 @@
             <a:graphicData uri="http://schemas.openxmlformats.org/presentationml/2006/ole">
               <mc:AlternateContent xmlns:mc="http://schemas.openxmlformats.org/markup-compatibility/2006">
                 <mc:Choice xmlns:v="urn:schemas-microsoft-com:vml" Requires="v">
-                  <p:oleObj spid="_x0000_s28682" name="Equation" r:id="rId3" imgW="635000" imgH="228600" progId="Equation.DSMT4">
+                  <p:oleObj spid="_x0000_s28684" name="Equation" r:id="rId3" imgW="635000" imgH="228600" progId="Equation.DSMT4">
                     <p:embed/>
                   </p:oleObj>
                 </mc:Choice>
@@ -20077,7 +20081,7 @@
           <a:graphicData uri="http://schemas.openxmlformats.org/presentationml/2006/ole">
             <mc:AlternateContent xmlns:mc="http://schemas.openxmlformats.org/markup-compatibility/2006">
               <mc:Choice xmlns:v="urn:schemas-microsoft-com:vml" Requires="v">
-                <p:oleObj spid="_x0000_s27657" name="Equation" r:id="rId3" imgW="635000" imgH="228600" progId="Equation.DSMT4">
+                <p:oleObj spid="_x0000_s27659" name="Equation" r:id="rId3" imgW="635000" imgH="228600" progId="Equation.DSMT4">
                   <p:embed/>
                 </p:oleObj>
               </mc:Choice>
@@ -22411,7 +22415,7 @@
           <a:graphicData uri="http://schemas.openxmlformats.org/presentationml/2006/ole">
             <mc:AlternateContent xmlns:mc="http://schemas.openxmlformats.org/markup-compatibility/2006">
               <mc:Choice xmlns:v="urn:schemas-microsoft-com:vml" Requires="v">
-                <p:oleObj spid="_x0000_s10283" name="Equation" r:id="rId3" imgW="635000" imgH="228600" progId="Equation.DSMT4">
+                <p:oleObj spid="_x0000_s10285" name="Equation" r:id="rId3" imgW="635000" imgH="228600" progId="Equation.DSMT4">
                   <p:embed/>
                 </p:oleObj>
               </mc:Choice>
@@ -22825,7 +22829,7 @@
             <a:graphicData uri="http://schemas.openxmlformats.org/presentationml/2006/ole">
               <mc:AlternateContent xmlns:mc="http://schemas.openxmlformats.org/markup-compatibility/2006">
                 <mc:Choice xmlns:v="urn:schemas-microsoft-com:vml" Requires="v">
-                  <p:oleObj spid="_x0000_s31755" name="Equation" r:id="rId3" imgW="635000" imgH="228600" progId="Equation.DSMT4">
+                  <p:oleObj spid="_x0000_s31757" name="Equation" r:id="rId3" imgW="635000" imgH="228600" progId="Equation.DSMT4">
                     <p:embed/>
                   </p:oleObj>
                 </mc:Choice>
@@ -24733,7 +24737,7 @@
           <a:graphicData uri="http://schemas.openxmlformats.org/presentationml/2006/ole">
             <mc:AlternateContent xmlns:mc="http://schemas.openxmlformats.org/markup-compatibility/2006">
               <mc:Choice xmlns:v="urn:schemas-microsoft-com:vml" Requires="v">
-                <p:oleObj spid="_x0000_s17430" name="Equation" r:id="rId3" imgW="635000" imgH="228600" progId="Equation.DSMT4">
+                <p:oleObj spid="_x0000_s17432" name="Equation" r:id="rId3" imgW="635000" imgH="228600" progId="Equation.DSMT4">
                   <p:embed/>
                 </p:oleObj>
               </mc:Choice>
@@ -26499,7 +26503,7 @@
           <a:graphicData uri="http://schemas.openxmlformats.org/presentationml/2006/ole">
             <mc:AlternateContent xmlns:mc="http://schemas.openxmlformats.org/markup-compatibility/2006">
               <mc:Choice xmlns:v="urn:schemas-microsoft-com:vml" Requires="v">
-                <p:oleObj spid="_x0000_s18452" name="Equation" r:id="rId3" imgW="635000" imgH="228600" progId="Equation.DSMT4">
+                <p:oleObj spid="_x0000_s18454" name="Equation" r:id="rId3" imgW="635000" imgH="228600" progId="Equation.DSMT4">
                   <p:embed/>
                 </p:oleObj>
               </mc:Choice>

</xml_diff>